<commit_message>
se subieron fotos de vistas
</commit_message>
<xml_diff>
--- a/PPT.pptx
+++ b/PPT.pptx
@@ -17,19 +17,23 @@
     <p:sldId id="264" r:id="rId11"/>
     <p:sldId id="269" r:id="rId12"/>
     <p:sldId id="286" r:id="rId13"/>
-    <p:sldId id="270" r:id="rId14"/>
-    <p:sldId id="271" r:id="rId15"/>
-    <p:sldId id="274" r:id="rId16"/>
-    <p:sldId id="272" r:id="rId17"/>
-    <p:sldId id="273" r:id="rId18"/>
-    <p:sldId id="275" r:id="rId19"/>
-    <p:sldId id="276" r:id="rId20"/>
-    <p:sldId id="277" r:id="rId21"/>
-    <p:sldId id="279" r:id="rId22"/>
-    <p:sldId id="280" r:id="rId23"/>
-    <p:sldId id="278" r:id="rId24"/>
-    <p:sldId id="282" r:id="rId25"/>
-    <p:sldId id="281" r:id="rId26"/>
+    <p:sldId id="288" r:id="rId14"/>
+    <p:sldId id="289" r:id="rId15"/>
+    <p:sldId id="290" r:id="rId16"/>
+    <p:sldId id="291" r:id="rId17"/>
+    <p:sldId id="270" r:id="rId18"/>
+    <p:sldId id="271" r:id="rId19"/>
+    <p:sldId id="274" r:id="rId20"/>
+    <p:sldId id="272" r:id="rId21"/>
+    <p:sldId id="273" r:id="rId22"/>
+    <p:sldId id="275" r:id="rId23"/>
+    <p:sldId id="276" r:id="rId24"/>
+    <p:sldId id="277" r:id="rId25"/>
+    <p:sldId id="279" r:id="rId26"/>
+    <p:sldId id="280" r:id="rId27"/>
+    <p:sldId id="278" r:id="rId28"/>
+    <p:sldId id="282" r:id="rId29"/>
+    <p:sldId id="281" r:id="rId30"/>
   </p:sldIdLst>
   <p:sldSz cx="12192000" cy="6858000"/>
   <p:notesSz cx="6858000" cy="9144000"/>
@@ -128,6 +132,11 @@
       </a:defRPr>
     </a:lvl9pPr>
   </p:defaultTextStyle>
+  <p:extLst>
+    <p:ext uri="{EFAFB233-063F-42B5-8137-9DF3F51BA10A}">
+      <p15:sldGuideLst xmlns:p15="http://schemas.microsoft.com/office/powerpoint/2012/main"/>
+    </p:ext>
+  </p:extLst>
 </p:presentation>
 </file>
 
@@ -3794,6 +3803,14 @@
 <file path=ppt/slides/slide12.xml><?xml version="1.0" encoding="utf-8"?>
 <p:sld xmlns:a="http://schemas.openxmlformats.org/drawingml/2006/main" xmlns:r="http://schemas.openxmlformats.org/officeDocument/2006/relationships" xmlns:p="http://schemas.openxmlformats.org/presentationml/2006/main">
   <p:cSld>
+    <p:bg>
+      <p:bgPr>
+        <a:solidFill>
+          <a:schemeClr val="accent2"/>
+        </a:solidFill>
+        <a:effectLst/>
+      </p:bgPr>
+    </p:bg>
     <p:spTree>
       <p:nvGrpSpPr>
         <p:cNvPr id="1" name=""/>
@@ -3808,10 +3825,148 @@
           <a:chExt cx="0" cy="0"/>
         </a:xfrm>
       </p:grpSpPr>
+      <p:sp>
+        <p:nvSpPr>
+          <p:cNvPr id="2" name="Título 1">
+            <a:extLst>
+              <a:ext uri="{FF2B5EF4-FFF2-40B4-BE49-F238E27FC236}">
+                <a16:creationId xmlns:a16="http://schemas.microsoft.com/office/drawing/2014/main" id="{232C9B98-3CD7-4436-8F43-1EB42FB92CD8}"/>
+              </a:ext>
+            </a:extLst>
+          </p:cNvPr>
+          <p:cNvSpPr>
+            <a:spLocks noGrp="1"/>
+          </p:cNvSpPr>
+          <p:nvPr>
+            <p:ph type="title"/>
+          </p:nvPr>
+        </p:nvSpPr>
+        <p:spPr>
+          <a:xfrm>
+            <a:off x="8787865" y="2921173"/>
+            <a:ext cx="2745667" cy="1015663"/>
+          </a:xfrm>
+        </p:spPr>
+        <p:txBody>
+          <a:bodyPr>
+            <a:normAutofit/>
+          </a:bodyPr>
+          <a:lstStyle/>
+          <a:p>
+            <a:r>
+              <a:rPr lang="es-CL" sz="2000" dirty="0" err="1"/>
+              <a:t>Login</a:t>
+            </a:r>
+            <a:endParaRPr lang="es-CL" sz="2000" dirty="0"/>
+          </a:p>
+        </p:txBody>
+      </p:sp>
+      <p:sp>
+        <p:nvSpPr>
+          <p:cNvPr id="21" name="Rectangle 20">
+            <a:extLst>
+              <a:ext uri="{FF2B5EF4-FFF2-40B4-BE49-F238E27FC236}">
+                <a16:creationId xmlns:a16="http://schemas.microsoft.com/office/drawing/2014/main" id="{43F30027-8F78-4D8F-9B43-E1C8B4D50E8D}"/>
+              </a:ext>
+              <a:ext uri="{C183D7F6-B498-43B3-948B-1728B52AA6E4}">
+                <adec:decorative xmlns:adec="http://schemas.microsoft.com/office/drawing/2017/decorative" val="1"/>
+              </a:ext>
+            </a:extLst>
+          </p:cNvPr>
+          <p:cNvSpPr>
+            <a:spLocks noGrp="1" noRot="1" noChangeAspect="1" noMove="1" noResize="1" noEditPoints="1" noAdjustHandles="1" noChangeArrowheads="1" noChangeShapeType="1" noTextEdit="1"/>
+          </p:cNvSpPr>
+          <p:nvPr>
+            <p:extLst>
+              <p:ext uri="{386F3935-93C4-4BCD-93E2-E3B085C9AB24}">
+                <p16:designElem xmlns:p16="http://schemas.microsoft.com/office/powerpoint/2015/main" val="1"/>
+              </p:ext>
+            </p:extLst>
+          </p:nvPr>
+        </p:nvSpPr>
+        <p:spPr>
+          <a:xfrm>
+            <a:off x="0" y="0"/>
+            <a:ext cx="8135425" cy="6858000"/>
+          </a:xfrm>
+          <a:prstGeom prst="rect">
+            <a:avLst/>
+          </a:prstGeom>
+          <a:solidFill>
+            <a:schemeClr val="bg1"/>
+          </a:solidFill>
+          <a:ln>
+            <a:noFill/>
+          </a:ln>
+        </p:spPr>
+        <p:style>
+          <a:lnRef idx="2">
+            <a:schemeClr val="accent1">
+              <a:shade val="50000"/>
+            </a:schemeClr>
+          </a:lnRef>
+          <a:fillRef idx="1">
+            <a:schemeClr val="accent1"/>
+          </a:fillRef>
+          <a:effectRef idx="0">
+            <a:schemeClr val="accent1"/>
+          </a:effectRef>
+          <a:fontRef idx="minor">
+            <a:schemeClr val="lt1"/>
+          </a:fontRef>
+        </p:style>
+        <p:txBody>
+          <a:bodyPr rtlCol="0" anchor="ctr"/>
+          <a:lstStyle/>
+          <a:p>
+            <a:pPr algn="ctr"/>
+            <a:endParaRPr lang="en-US"/>
+          </a:p>
+        </p:txBody>
+      </p:sp>
+      <p:pic>
+        <p:nvPicPr>
+          <p:cNvPr id="3" name="Imagen 2">
+            <a:extLst>
+              <a:ext uri="{FF2B5EF4-FFF2-40B4-BE49-F238E27FC236}">
+                <a16:creationId xmlns:a16="http://schemas.microsoft.com/office/drawing/2014/main" id="{C8E3B937-BCE3-4B57-A934-69603C47411D}"/>
+              </a:ext>
+            </a:extLst>
+          </p:cNvPr>
+          <p:cNvPicPr/>
+          <p:nvPr/>
+        </p:nvPicPr>
+        <p:blipFill rotWithShape="1">
+          <a:blip r:embed="rId2">
+            <a:extLst>
+              <a:ext uri="{28A0092B-C50C-407E-A947-70E740481C1C}">
+                <a14:useLocalDpi xmlns:a14="http://schemas.microsoft.com/office/drawing/2010/main" val="0"/>
+              </a:ext>
+            </a:extLst>
+          </a:blip>
+          <a:srcRect b="1828"/>
+          <a:stretch/>
+        </p:blipFill>
+        <p:spPr bwMode="auto">
+          <a:xfrm>
+            <a:off x="212035" y="72887"/>
+            <a:ext cx="6609776" cy="6712226"/>
+          </a:xfrm>
+          <a:prstGeom prst="rect">
+            <a:avLst/>
+          </a:prstGeom>
+          <a:noFill/>
+          <a:extLst>
+            <a:ext uri="{53640926-AAD7-44D8-BBD7-CCE9431645EC}">
+              <a14:shadowObscured xmlns:a14="http://schemas.microsoft.com/office/drawing/2010/main"/>
+            </a:ext>
+          </a:extLst>
+        </p:spPr>
+      </p:pic>
     </p:spTree>
     <p:extLst>
       <p:ext uri="{BB962C8B-B14F-4D97-AF65-F5344CB8AC3E}">
-        <p14:creationId xmlns:p14="http://schemas.microsoft.com/office/powerpoint/2010/main" val="248810872"/>
+        <p14:creationId xmlns:p14="http://schemas.microsoft.com/office/powerpoint/2010/main" val="2415811276"/>
       </p:ext>
     </p:extLst>
   </p:cSld>
@@ -3822,6 +3977,697 @@
 </file>
 
 <file path=ppt/slides/slide13.xml><?xml version="1.0" encoding="utf-8"?>
+<p:sld xmlns:a="http://schemas.openxmlformats.org/drawingml/2006/main" xmlns:r="http://schemas.openxmlformats.org/officeDocument/2006/relationships" xmlns:p="http://schemas.openxmlformats.org/presentationml/2006/main">
+  <p:cSld>
+    <p:bg>
+      <p:bgPr>
+        <a:solidFill>
+          <a:schemeClr val="accent2"/>
+        </a:solidFill>
+        <a:effectLst/>
+      </p:bgPr>
+    </p:bg>
+    <p:spTree>
+      <p:nvGrpSpPr>
+        <p:cNvPr id="1" name=""/>
+        <p:cNvGrpSpPr/>
+        <p:nvPr/>
+      </p:nvGrpSpPr>
+      <p:grpSpPr>
+        <a:xfrm>
+          <a:off x="0" y="0"/>
+          <a:ext cx="0" cy="0"/>
+          <a:chOff x="0" y="0"/>
+          <a:chExt cx="0" cy="0"/>
+        </a:xfrm>
+      </p:grpSpPr>
+      <p:sp>
+        <p:nvSpPr>
+          <p:cNvPr id="2" name="Título 1">
+            <a:extLst>
+              <a:ext uri="{FF2B5EF4-FFF2-40B4-BE49-F238E27FC236}">
+                <a16:creationId xmlns:a16="http://schemas.microsoft.com/office/drawing/2014/main" id="{232C9B98-3CD7-4436-8F43-1EB42FB92CD8}"/>
+              </a:ext>
+            </a:extLst>
+          </p:cNvPr>
+          <p:cNvSpPr>
+            <a:spLocks noGrp="1"/>
+          </p:cNvSpPr>
+          <p:nvPr>
+            <p:ph type="title"/>
+          </p:nvPr>
+        </p:nvSpPr>
+        <p:spPr>
+          <a:xfrm>
+            <a:off x="8787865" y="2921173"/>
+            <a:ext cx="2745667" cy="1015663"/>
+          </a:xfrm>
+        </p:spPr>
+        <p:txBody>
+          <a:bodyPr>
+            <a:normAutofit/>
+          </a:bodyPr>
+          <a:lstStyle/>
+          <a:p>
+            <a:r>
+              <a:rPr lang="es-CL" sz="2000" dirty="0" err="1"/>
+              <a:t>Registo</a:t>
+            </a:r>
+            <a:endParaRPr lang="es-CL" sz="2000" dirty="0"/>
+          </a:p>
+        </p:txBody>
+      </p:sp>
+      <p:sp>
+        <p:nvSpPr>
+          <p:cNvPr id="10" name="Rectangle 9">
+            <a:extLst>
+              <a:ext uri="{FF2B5EF4-FFF2-40B4-BE49-F238E27FC236}">
+                <a16:creationId xmlns:a16="http://schemas.microsoft.com/office/drawing/2014/main" id="{43F30027-8F78-4D8F-9B43-E1C8B4D50E8D}"/>
+              </a:ext>
+              <a:ext uri="{C183D7F6-B498-43B3-948B-1728B52AA6E4}">
+                <adec:decorative xmlns:adec="http://schemas.microsoft.com/office/drawing/2017/decorative" val="1"/>
+              </a:ext>
+            </a:extLst>
+          </p:cNvPr>
+          <p:cNvSpPr>
+            <a:spLocks noGrp="1" noRot="1" noChangeAspect="1" noMove="1" noResize="1" noEditPoints="1" noAdjustHandles="1" noChangeArrowheads="1" noChangeShapeType="1" noTextEdit="1"/>
+          </p:cNvSpPr>
+          <p:nvPr>
+            <p:extLst>
+              <p:ext uri="{386F3935-93C4-4BCD-93E2-E3B085C9AB24}">
+                <p16:designElem xmlns:p16="http://schemas.microsoft.com/office/powerpoint/2015/main" val="1"/>
+              </p:ext>
+            </p:extLst>
+          </p:nvPr>
+        </p:nvSpPr>
+        <p:spPr>
+          <a:xfrm>
+            <a:off x="0" y="0"/>
+            <a:ext cx="8135425" cy="6858000"/>
+          </a:xfrm>
+          <a:prstGeom prst="rect">
+            <a:avLst/>
+          </a:prstGeom>
+          <a:solidFill>
+            <a:schemeClr val="bg1"/>
+          </a:solidFill>
+          <a:ln>
+            <a:noFill/>
+          </a:ln>
+        </p:spPr>
+        <p:style>
+          <a:lnRef idx="2">
+            <a:schemeClr val="accent1">
+              <a:shade val="50000"/>
+            </a:schemeClr>
+          </a:lnRef>
+          <a:fillRef idx="1">
+            <a:schemeClr val="accent1"/>
+          </a:fillRef>
+          <a:effectRef idx="0">
+            <a:schemeClr val="accent1"/>
+          </a:effectRef>
+          <a:fontRef idx="minor">
+            <a:schemeClr val="lt1"/>
+          </a:fontRef>
+        </p:style>
+        <p:txBody>
+          <a:bodyPr rtlCol="0" anchor="ctr"/>
+          <a:lstStyle/>
+          <a:p>
+            <a:pPr algn="ctr"/>
+            <a:endParaRPr lang="en-US"/>
+          </a:p>
+        </p:txBody>
+      </p:sp>
+      <p:pic>
+        <p:nvPicPr>
+          <p:cNvPr id="5" name="Imagen 4">
+            <a:extLst>
+              <a:ext uri="{FF2B5EF4-FFF2-40B4-BE49-F238E27FC236}">
+                <a16:creationId xmlns:a16="http://schemas.microsoft.com/office/drawing/2014/main" id="{EEFD34E4-8658-492F-9C3F-35DB0C15F6C6}"/>
+              </a:ext>
+            </a:extLst>
+          </p:cNvPr>
+          <p:cNvPicPr/>
+          <p:nvPr/>
+        </p:nvPicPr>
+        <p:blipFill rotWithShape="1">
+          <a:blip r:embed="rId2">
+            <a:extLst>
+              <a:ext uri="{28A0092B-C50C-407E-A947-70E740481C1C}">
+                <a14:useLocalDpi xmlns:a14="http://schemas.microsoft.com/office/drawing/2010/main" val="0"/>
+              </a:ext>
+            </a:extLst>
+          </a:blip>
+          <a:srcRect t="-1" r="3168" b="1253"/>
+          <a:stretch/>
+        </p:blipFill>
+        <p:spPr bwMode="auto">
+          <a:xfrm>
+            <a:off x="211015" y="98474"/>
+            <a:ext cx="6246055" cy="6597748"/>
+          </a:xfrm>
+          <a:prstGeom prst="rect">
+            <a:avLst/>
+          </a:prstGeom>
+          <a:noFill/>
+          <a:extLst>
+            <a:ext uri="{53640926-AAD7-44D8-BBD7-CCE9431645EC}">
+              <a14:shadowObscured xmlns:a14="http://schemas.microsoft.com/office/drawing/2010/main"/>
+            </a:ext>
+          </a:extLst>
+        </p:spPr>
+      </p:pic>
+    </p:spTree>
+    <p:extLst>
+      <p:ext uri="{BB962C8B-B14F-4D97-AF65-F5344CB8AC3E}">
+        <p14:creationId xmlns:p14="http://schemas.microsoft.com/office/powerpoint/2010/main" val="910165214"/>
+      </p:ext>
+    </p:extLst>
+  </p:cSld>
+  <p:clrMapOvr>
+    <a:masterClrMapping/>
+  </p:clrMapOvr>
+</p:sld>
+</file>
+
+<file path=ppt/slides/slide14.xml><?xml version="1.0" encoding="utf-8"?>
+<p:sld xmlns:a="http://schemas.openxmlformats.org/drawingml/2006/main" xmlns:r="http://schemas.openxmlformats.org/officeDocument/2006/relationships" xmlns:p="http://schemas.openxmlformats.org/presentationml/2006/main">
+  <p:cSld>
+    <p:bg>
+      <p:bgPr>
+        <a:solidFill>
+          <a:schemeClr val="accent2"/>
+        </a:solidFill>
+        <a:effectLst/>
+      </p:bgPr>
+    </p:bg>
+    <p:spTree>
+      <p:nvGrpSpPr>
+        <p:cNvPr id="1" name=""/>
+        <p:cNvGrpSpPr/>
+        <p:nvPr/>
+      </p:nvGrpSpPr>
+      <p:grpSpPr>
+        <a:xfrm>
+          <a:off x="0" y="0"/>
+          <a:ext cx="0" cy="0"/>
+          <a:chOff x="0" y="0"/>
+          <a:chExt cx="0" cy="0"/>
+        </a:xfrm>
+      </p:grpSpPr>
+      <p:sp>
+        <p:nvSpPr>
+          <p:cNvPr id="2" name="Título 1">
+            <a:extLst>
+              <a:ext uri="{FF2B5EF4-FFF2-40B4-BE49-F238E27FC236}">
+                <a16:creationId xmlns:a16="http://schemas.microsoft.com/office/drawing/2014/main" id="{E6E6795F-8797-40FE-9D4E-D89450F5EFF8}"/>
+              </a:ext>
+            </a:extLst>
+          </p:cNvPr>
+          <p:cNvSpPr>
+            <a:spLocks noGrp="1"/>
+          </p:cNvSpPr>
+          <p:nvPr>
+            <p:ph type="title"/>
+          </p:nvPr>
+        </p:nvSpPr>
+        <p:spPr>
+          <a:xfrm>
+            <a:off x="8787865" y="2921173"/>
+            <a:ext cx="2745667" cy="1015663"/>
+          </a:xfrm>
+        </p:spPr>
+        <p:txBody>
+          <a:bodyPr>
+            <a:normAutofit/>
+          </a:bodyPr>
+          <a:lstStyle/>
+          <a:p>
+            <a:r>
+              <a:rPr lang="es-CL" sz="2000" dirty="0"/>
+              <a:t>Ventana PRINCIPAL</a:t>
+            </a:r>
+          </a:p>
+        </p:txBody>
+      </p:sp>
+      <p:sp>
+        <p:nvSpPr>
+          <p:cNvPr id="8" name="Rectangle 7">
+            <a:extLst>
+              <a:ext uri="{FF2B5EF4-FFF2-40B4-BE49-F238E27FC236}">
+                <a16:creationId xmlns:a16="http://schemas.microsoft.com/office/drawing/2014/main" id="{43F30027-8F78-4D8F-9B43-E1C8B4D50E8D}"/>
+              </a:ext>
+              <a:ext uri="{C183D7F6-B498-43B3-948B-1728B52AA6E4}">
+                <adec:decorative xmlns:adec="http://schemas.microsoft.com/office/drawing/2017/decorative" val="1"/>
+              </a:ext>
+            </a:extLst>
+          </p:cNvPr>
+          <p:cNvSpPr>
+            <a:spLocks noGrp="1" noRot="1" noChangeAspect="1" noMove="1" noResize="1" noEditPoints="1" noAdjustHandles="1" noChangeArrowheads="1" noChangeShapeType="1" noTextEdit="1"/>
+          </p:cNvSpPr>
+          <p:nvPr>
+            <p:extLst>
+              <p:ext uri="{386F3935-93C4-4BCD-93E2-E3B085C9AB24}">
+                <p16:designElem xmlns:p16="http://schemas.microsoft.com/office/powerpoint/2015/main" val="1"/>
+              </p:ext>
+            </p:extLst>
+          </p:nvPr>
+        </p:nvSpPr>
+        <p:spPr>
+          <a:xfrm>
+            <a:off x="0" y="0"/>
+            <a:ext cx="8135425" cy="6858000"/>
+          </a:xfrm>
+          <a:prstGeom prst="rect">
+            <a:avLst/>
+          </a:prstGeom>
+          <a:solidFill>
+            <a:schemeClr val="bg1"/>
+          </a:solidFill>
+          <a:ln>
+            <a:noFill/>
+          </a:ln>
+        </p:spPr>
+        <p:style>
+          <a:lnRef idx="2">
+            <a:schemeClr val="accent1">
+              <a:shade val="50000"/>
+            </a:schemeClr>
+          </a:lnRef>
+          <a:fillRef idx="1">
+            <a:schemeClr val="accent1"/>
+          </a:fillRef>
+          <a:effectRef idx="0">
+            <a:schemeClr val="accent1"/>
+          </a:effectRef>
+          <a:fontRef idx="minor">
+            <a:schemeClr val="lt1"/>
+          </a:fontRef>
+        </p:style>
+        <p:txBody>
+          <a:bodyPr rtlCol="0" anchor="ctr"/>
+          <a:lstStyle/>
+          <a:p>
+            <a:pPr algn="ctr"/>
+            <a:endParaRPr lang="en-US"/>
+          </a:p>
+        </p:txBody>
+      </p:sp>
+      <p:pic>
+        <p:nvPicPr>
+          <p:cNvPr id="3" name="Imagen 2">
+            <a:extLst>
+              <a:ext uri="{FF2B5EF4-FFF2-40B4-BE49-F238E27FC236}">
+                <a16:creationId xmlns:a16="http://schemas.microsoft.com/office/drawing/2014/main" id="{0B07AA2D-C2FC-415B-9313-B75155B8BCEE}"/>
+              </a:ext>
+            </a:extLst>
+          </p:cNvPr>
+          <p:cNvPicPr/>
+          <p:nvPr/>
+        </p:nvPicPr>
+        <p:blipFill rotWithShape="1">
+          <a:blip r:embed="rId2">
+            <a:extLst>
+              <a:ext uri="{28A0092B-C50C-407E-A947-70E740481C1C}">
+                <a14:useLocalDpi xmlns:a14="http://schemas.microsoft.com/office/drawing/2010/main" val="0"/>
+              </a:ext>
+            </a:extLst>
+          </a:blip>
+          <a:srcRect l="45205" t="6374" r="1122" b="51983"/>
+          <a:stretch/>
+        </p:blipFill>
+        <p:spPr bwMode="auto">
+          <a:xfrm>
+            <a:off x="225287" y="-39756"/>
+            <a:ext cx="6892965" cy="6858000"/>
+          </a:xfrm>
+          <a:prstGeom prst="rect">
+            <a:avLst/>
+          </a:prstGeom>
+          <a:noFill/>
+          <a:extLst>
+            <a:ext uri="{53640926-AAD7-44D8-BBD7-CCE9431645EC}">
+              <a14:shadowObscured xmlns:a14="http://schemas.microsoft.com/office/drawing/2010/main"/>
+            </a:ext>
+          </a:extLst>
+        </p:spPr>
+      </p:pic>
+    </p:spTree>
+    <p:extLst>
+      <p:ext uri="{BB962C8B-B14F-4D97-AF65-F5344CB8AC3E}">
+        <p14:creationId xmlns:p14="http://schemas.microsoft.com/office/powerpoint/2010/main" val="3277686855"/>
+      </p:ext>
+    </p:extLst>
+  </p:cSld>
+  <p:clrMapOvr>
+    <a:masterClrMapping/>
+  </p:clrMapOvr>
+</p:sld>
+</file>
+
+<file path=ppt/slides/slide15.xml><?xml version="1.0" encoding="utf-8"?>
+<p:sld xmlns:a="http://schemas.openxmlformats.org/drawingml/2006/main" xmlns:r="http://schemas.openxmlformats.org/officeDocument/2006/relationships" xmlns:p="http://schemas.openxmlformats.org/presentationml/2006/main">
+  <p:cSld>
+    <p:bg>
+      <p:bgPr>
+        <a:solidFill>
+          <a:schemeClr val="accent2"/>
+        </a:solidFill>
+        <a:effectLst/>
+      </p:bgPr>
+    </p:bg>
+    <p:spTree>
+      <p:nvGrpSpPr>
+        <p:cNvPr id="1" name=""/>
+        <p:cNvGrpSpPr/>
+        <p:nvPr/>
+      </p:nvGrpSpPr>
+      <p:grpSpPr>
+        <a:xfrm>
+          <a:off x="0" y="0"/>
+          <a:ext cx="0" cy="0"/>
+          <a:chOff x="0" y="0"/>
+          <a:chExt cx="0" cy="0"/>
+        </a:xfrm>
+      </p:grpSpPr>
+      <p:sp>
+        <p:nvSpPr>
+          <p:cNvPr id="2" name="Título 1">
+            <a:extLst>
+              <a:ext uri="{FF2B5EF4-FFF2-40B4-BE49-F238E27FC236}">
+                <a16:creationId xmlns:a16="http://schemas.microsoft.com/office/drawing/2014/main" id="{FA79693E-38B1-44EE-90AB-CC42FA068461}"/>
+              </a:ext>
+            </a:extLst>
+          </p:cNvPr>
+          <p:cNvSpPr>
+            <a:spLocks noGrp="1"/>
+          </p:cNvSpPr>
+          <p:nvPr>
+            <p:ph type="title"/>
+          </p:nvPr>
+        </p:nvSpPr>
+        <p:spPr>
+          <a:xfrm>
+            <a:off x="8787865" y="2921173"/>
+            <a:ext cx="2745667" cy="1015663"/>
+          </a:xfrm>
+        </p:spPr>
+        <p:txBody>
+          <a:bodyPr>
+            <a:normAutofit/>
+          </a:bodyPr>
+          <a:lstStyle/>
+          <a:p>
+            <a:r>
+              <a:rPr lang="es-CL" sz="2000" dirty="0"/>
+              <a:t>Subir un reto</a:t>
+            </a:r>
+          </a:p>
+        </p:txBody>
+      </p:sp>
+      <p:sp>
+        <p:nvSpPr>
+          <p:cNvPr id="8" name="Rectangle 7">
+            <a:extLst>
+              <a:ext uri="{FF2B5EF4-FFF2-40B4-BE49-F238E27FC236}">
+                <a16:creationId xmlns:a16="http://schemas.microsoft.com/office/drawing/2014/main" id="{43F30027-8F78-4D8F-9B43-E1C8B4D50E8D}"/>
+              </a:ext>
+              <a:ext uri="{C183D7F6-B498-43B3-948B-1728B52AA6E4}">
+                <adec:decorative xmlns:adec="http://schemas.microsoft.com/office/drawing/2017/decorative" val="1"/>
+              </a:ext>
+            </a:extLst>
+          </p:cNvPr>
+          <p:cNvSpPr>
+            <a:spLocks noGrp="1" noRot="1" noChangeAspect="1" noMove="1" noResize="1" noEditPoints="1" noAdjustHandles="1" noChangeArrowheads="1" noChangeShapeType="1" noTextEdit="1"/>
+          </p:cNvSpPr>
+          <p:nvPr>
+            <p:extLst>
+              <p:ext uri="{386F3935-93C4-4BCD-93E2-E3B085C9AB24}">
+                <p16:designElem xmlns:p16="http://schemas.microsoft.com/office/powerpoint/2015/main" val="1"/>
+              </p:ext>
+            </p:extLst>
+          </p:nvPr>
+        </p:nvSpPr>
+        <p:spPr>
+          <a:xfrm>
+            <a:off x="0" y="0"/>
+            <a:ext cx="8135425" cy="6858000"/>
+          </a:xfrm>
+          <a:prstGeom prst="rect">
+            <a:avLst/>
+          </a:prstGeom>
+          <a:solidFill>
+            <a:schemeClr val="bg1"/>
+          </a:solidFill>
+          <a:ln>
+            <a:noFill/>
+          </a:ln>
+        </p:spPr>
+        <p:style>
+          <a:lnRef idx="2">
+            <a:schemeClr val="accent1">
+              <a:shade val="50000"/>
+            </a:schemeClr>
+          </a:lnRef>
+          <a:fillRef idx="1">
+            <a:schemeClr val="accent1"/>
+          </a:fillRef>
+          <a:effectRef idx="0">
+            <a:schemeClr val="accent1"/>
+          </a:effectRef>
+          <a:fontRef idx="minor">
+            <a:schemeClr val="lt1"/>
+          </a:fontRef>
+        </p:style>
+        <p:txBody>
+          <a:bodyPr rtlCol="0" anchor="ctr"/>
+          <a:lstStyle/>
+          <a:p>
+            <a:pPr algn="ctr"/>
+            <a:endParaRPr lang="en-US"/>
+          </a:p>
+        </p:txBody>
+      </p:sp>
+      <p:pic>
+        <p:nvPicPr>
+          <p:cNvPr id="3" name="Imagen 2">
+            <a:extLst>
+              <a:ext uri="{FF2B5EF4-FFF2-40B4-BE49-F238E27FC236}">
+                <a16:creationId xmlns:a16="http://schemas.microsoft.com/office/drawing/2014/main" id="{15435C0C-E231-42C3-9684-3B666C1120CF}"/>
+              </a:ext>
+            </a:extLst>
+          </p:cNvPr>
+          <p:cNvPicPr/>
+          <p:nvPr/>
+        </p:nvPicPr>
+        <p:blipFill rotWithShape="1">
+          <a:blip r:embed="rId2">
+            <a:extLst>
+              <a:ext uri="{28A0092B-C50C-407E-A947-70E740481C1C}">
+                <a14:useLocalDpi xmlns:a14="http://schemas.microsoft.com/office/drawing/2010/main" val="0"/>
+              </a:ext>
+            </a:extLst>
+          </a:blip>
+          <a:srcRect l="29392" t="15747" r="404"/>
+          <a:stretch/>
+        </p:blipFill>
+        <p:spPr bwMode="auto">
+          <a:xfrm>
+            <a:off x="0" y="0"/>
+            <a:ext cx="7765774" cy="6228522"/>
+          </a:xfrm>
+          <a:prstGeom prst="rect">
+            <a:avLst/>
+          </a:prstGeom>
+          <a:noFill/>
+          <a:extLst>
+            <a:ext uri="{53640926-AAD7-44D8-BBD7-CCE9431645EC}">
+              <a14:shadowObscured xmlns:a14="http://schemas.microsoft.com/office/drawing/2010/main"/>
+            </a:ext>
+          </a:extLst>
+        </p:spPr>
+      </p:pic>
+    </p:spTree>
+    <p:extLst>
+      <p:ext uri="{BB962C8B-B14F-4D97-AF65-F5344CB8AC3E}">
+        <p14:creationId xmlns:p14="http://schemas.microsoft.com/office/powerpoint/2010/main" val="3135237899"/>
+      </p:ext>
+    </p:extLst>
+  </p:cSld>
+  <p:clrMapOvr>
+    <a:masterClrMapping/>
+  </p:clrMapOvr>
+</p:sld>
+</file>
+
+<file path=ppt/slides/slide16.xml><?xml version="1.0" encoding="utf-8"?>
+<p:sld xmlns:a="http://schemas.openxmlformats.org/drawingml/2006/main" xmlns:r="http://schemas.openxmlformats.org/officeDocument/2006/relationships" xmlns:p="http://schemas.openxmlformats.org/presentationml/2006/main">
+  <p:cSld>
+    <p:bg>
+      <p:bgPr>
+        <a:solidFill>
+          <a:schemeClr val="accent2"/>
+        </a:solidFill>
+        <a:effectLst/>
+      </p:bgPr>
+    </p:bg>
+    <p:spTree>
+      <p:nvGrpSpPr>
+        <p:cNvPr id="1" name=""/>
+        <p:cNvGrpSpPr/>
+        <p:nvPr/>
+      </p:nvGrpSpPr>
+      <p:grpSpPr>
+        <a:xfrm>
+          <a:off x="0" y="0"/>
+          <a:ext cx="0" cy="0"/>
+          <a:chOff x="0" y="0"/>
+          <a:chExt cx="0" cy="0"/>
+        </a:xfrm>
+      </p:grpSpPr>
+      <p:sp>
+        <p:nvSpPr>
+          <p:cNvPr id="2" name="Título 1">
+            <a:extLst>
+              <a:ext uri="{FF2B5EF4-FFF2-40B4-BE49-F238E27FC236}">
+                <a16:creationId xmlns:a16="http://schemas.microsoft.com/office/drawing/2014/main" id="{50596CDA-D0BB-42D0-BDE8-5886561D00FE}"/>
+              </a:ext>
+            </a:extLst>
+          </p:cNvPr>
+          <p:cNvSpPr>
+            <a:spLocks noGrp="1"/>
+          </p:cNvSpPr>
+          <p:nvPr>
+            <p:ph type="title"/>
+          </p:nvPr>
+        </p:nvSpPr>
+        <p:spPr>
+          <a:xfrm>
+            <a:off x="8787865" y="2921173"/>
+            <a:ext cx="2745667" cy="1015663"/>
+          </a:xfrm>
+        </p:spPr>
+        <p:txBody>
+          <a:bodyPr>
+            <a:normAutofit/>
+          </a:bodyPr>
+          <a:lstStyle/>
+          <a:p>
+            <a:r>
+              <a:rPr lang="es-CL" sz="2000" dirty="0"/>
+              <a:t>Subir una idea</a:t>
+            </a:r>
+          </a:p>
+        </p:txBody>
+      </p:sp>
+      <p:sp>
+        <p:nvSpPr>
+          <p:cNvPr id="9" name="Rectangle 8">
+            <a:extLst>
+              <a:ext uri="{FF2B5EF4-FFF2-40B4-BE49-F238E27FC236}">
+                <a16:creationId xmlns:a16="http://schemas.microsoft.com/office/drawing/2014/main" id="{43F30027-8F78-4D8F-9B43-E1C8B4D50E8D}"/>
+              </a:ext>
+              <a:ext uri="{C183D7F6-B498-43B3-948B-1728B52AA6E4}">
+                <adec:decorative xmlns:adec="http://schemas.microsoft.com/office/drawing/2017/decorative" val="1"/>
+              </a:ext>
+            </a:extLst>
+          </p:cNvPr>
+          <p:cNvSpPr>
+            <a:spLocks noGrp="1" noRot="1" noChangeAspect="1" noMove="1" noResize="1" noEditPoints="1" noAdjustHandles="1" noChangeArrowheads="1" noChangeShapeType="1" noTextEdit="1"/>
+          </p:cNvSpPr>
+          <p:nvPr>
+            <p:extLst>
+              <p:ext uri="{386F3935-93C4-4BCD-93E2-E3B085C9AB24}">
+                <p16:designElem xmlns:p16="http://schemas.microsoft.com/office/powerpoint/2015/main" val="1"/>
+              </p:ext>
+            </p:extLst>
+          </p:nvPr>
+        </p:nvSpPr>
+        <p:spPr>
+          <a:xfrm>
+            <a:off x="0" y="0"/>
+            <a:ext cx="8135425" cy="6858000"/>
+          </a:xfrm>
+          <a:prstGeom prst="rect">
+            <a:avLst/>
+          </a:prstGeom>
+          <a:solidFill>
+            <a:schemeClr val="bg1"/>
+          </a:solidFill>
+          <a:ln>
+            <a:noFill/>
+          </a:ln>
+        </p:spPr>
+        <p:style>
+          <a:lnRef idx="2">
+            <a:schemeClr val="accent1">
+              <a:shade val="50000"/>
+            </a:schemeClr>
+          </a:lnRef>
+          <a:fillRef idx="1">
+            <a:schemeClr val="accent1"/>
+          </a:fillRef>
+          <a:effectRef idx="0">
+            <a:schemeClr val="accent1"/>
+          </a:effectRef>
+          <a:fontRef idx="minor">
+            <a:schemeClr val="lt1"/>
+          </a:fontRef>
+        </p:style>
+        <p:txBody>
+          <a:bodyPr rtlCol="0" anchor="ctr"/>
+          <a:lstStyle/>
+          <a:p>
+            <a:pPr algn="ctr"/>
+            <a:endParaRPr lang="en-US"/>
+          </a:p>
+        </p:txBody>
+      </p:sp>
+      <p:pic>
+        <p:nvPicPr>
+          <p:cNvPr id="4" name="Imagen 3" descr="Imagen que contiene captura de pantalla&#10;&#10;Descripción generada con confianza muy alta">
+            <a:extLst>
+              <a:ext uri="{FF2B5EF4-FFF2-40B4-BE49-F238E27FC236}">
+                <a16:creationId xmlns:a16="http://schemas.microsoft.com/office/drawing/2014/main" id="{C28D80E3-AB1B-4F25-9D98-89EDBE657D3C}"/>
+              </a:ext>
+            </a:extLst>
+          </p:cNvPr>
+          <p:cNvPicPr>
+            <a:picLocks noChangeAspect="1"/>
+          </p:cNvPicPr>
+          <p:nvPr/>
+        </p:nvPicPr>
+        <p:blipFill rotWithShape="1">
+          <a:blip r:embed="rId2"/>
+          <a:srcRect l="51024" t="10826" r="1009" b="34873"/>
+          <a:stretch/>
+        </p:blipFill>
+        <p:spPr>
+          <a:xfrm>
+            <a:off x="-1" y="-39757"/>
+            <a:ext cx="6944140" cy="6992873"/>
+          </a:xfrm>
+          <a:prstGeom prst="rect">
+            <a:avLst/>
+          </a:prstGeom>
+        </p:spPr>
+      </p:pic>
+    </p:spTree>
+    <p:extLst>
+      <p:ext uri="{BB962C8B-B14F-4D97-AF65-F5344CB8AC3E}">
+        <p14:creationId xmlns:p14="http://schemas.microsoft.com/office/powerpoint/2010/main" val="3038714743"/>
+      </p:ext>
+    </p:extLst>
+  </p:cSld>
+  <p:clrMapOvr>
+    <a:masterClrMapping/>
+  </p:clrMapOvr>
+</p:sld>
+</file>
+
+<file path=ppt/slides/slide17.xml><?xml version="1.0" encoding="utf-8"?>
 <p:sld xmlns:a="http://schemas.openxmlformats.org/drawingml/2006/main" xmlns:r="http://schemas.openxmlformats.org/officeDocument/2006/relationships" xmlns:p="http://schemas.openxmlformats.org/presentationml/2006/main">
   <p:cSld>
     <p:spTree>
@@ -3879,7 +4725,7 @@
 </p:sld>
 </file>
 
-<file path=ppt/slides/slide14.xml><?xml version="1.0" encoding="utf-8"?>
+<file path=ppt/slides/slide18.xml><?xml version="1.0" encoding="utf-8"?>
 <p:sld xmlns:a="http://schemas.openxmlformats.org/drawingml/2006/main" xmlns:r="http://schemas.openxmlformats.org/officeDocument/2006/relationships" xmlns:p="http://schemas.openxmlformats.org/presentationml/2006/main">
   <p:cSld>
     <p:spTree>
@@ -3942,7 +4788,7 @@
 </p:sld>
 </file>
 
-<file path=ppt/slides/slide15.xml><?xml version="1.0" encoding="utf-8"?>
+<file path=ppt/slides/slide19.xml><?xml version="1.0" encoding="utf-8"?>
 <p:sld xmlns:a="http://schemas.openxmlformats.org/drawingml/2006/main" xmlns:r="http://schemas.openxmlformats.org/officeDocument/2006/relationships" xmlns:p="http://schemas.openxmlformats.org/presentationml/2006/main">
   <p:cSld>
     <p:bg>
@@ -4010,7 +4856,355 @@
 </p:sld>
 </file>
 
-<file path=ppt/slides/slide16.xml><?xml version="1.0" encoding="utf-8"?>
+<file path=ppt/slides/slide2.xml><?xml version="1.0" encoding="utf-8"?>
+<p:sld xmlns:a="http://schemas.openxmlformats.org/drawingml/2006/main" xmlns:r="http://schemas.openxmlformats.org/officeDocument/2006/relationships" xmlns:p="http://schemas.openxmlformats.org/presentationml/2006/main">
+  <p:cSld>
+    <p:spTree>
+      <p:nvGrpSpPr>
+        <p:cNvPr id="1" name=""/>
+        <p:cNvGrpSpPr/>
+        <p:nvPr/>
+      </p:nvGrpSpPr>
+      <p:grpSpPr>
+        <a:xfrm>
+          <a:off x="0" y="0"/>
+          <a:ext cx="0" cy="0"/>
+          <a:chOff x="0" y="0"/>
+          <a:chExt cx="0" cy="0"/>
+        </a:xfrm>
+      </p:grpSpPr>
+      <p:sp>
+        <p:nvSpPr>
+          <p:cNvPr id="2" name="Título 1">
+            <a:extLst>
+              <a:ext uri="{FF2B5EF4-FFF2-40B4-BE49-F238E27FC236}">
+                <a16:creationId xmlns:a16="http://schemas.microsoft.com/office/drawing/2014/main" id="{D3FCCAF2-47B3-4517-B296-12ABA7D65A9C}"/>
+              </a:ext>
+            </a:extLst>
+          </p:cNvPr>
+          <p:cNvSpPr>
+            <a:spLocks noGrp="1"/>
+          </p:cNvSpPr>
+          <p:nvPr>
+            <p:ph type="title"/>
+          </p:nvPr>
+        </p:nvSpPr>
+        <p:spPr/>
+        <p:txBody>
+          <a:bodyPr/>
+          <a:lstStyle/>
+          <a:p>
+            <a:r>
+              <a:rPr lang="es-CL" dirty="0"/>
+              <a:t>Contenido</a:t>
+            </a:r>
+          </a:p>
+        </p:txBody>
+      </p:sp>
+      <p:sp>
+        <p:nvSpPr>
+          <p:cNvPr id="3" name="Marcador de contenido 2">
+            <a:extLst>
+              <a:ext uri="{FF2B5EF4-FFF2-40B4-BE49-F238E27FC236}">
+                <a16:creationId xmlns:a16="http://schemas.microsoft.com/office/drawing/2014/main" id="{92474900-A44B-4DA3-B82C-CD77BBF795F7}"/>
+              </a:ext>
+            </a:extLst>
+          </p:cNvPr>
+          <p:cNvSpPr>
+            <a:spLocks noGrp="1"/>
+          </p:cNvSpPr>
+          <p:nvPr>
+            <p:ph idx="1"/>
+          </p:nvPr>
+        </p:nvSpPr>
+        <p:spPr/>
+        <p:txBody>
+          <a:bodyPr/>
+          <a:lstStyle/>
+          <a:p>
+            <a:pPr marL="0" indent="0">
+              <a:lnSpc>
+                <a:spcPct val="150000"/>
+              </a:lnSpc>
+              <a:buNone/>
+            </a:pPr>
+            <a:r>
+              <a:rPr lang="es-CL" dirty="0"/>
+              <a:t>	</a:t>
+            </a:r>
+            <a:r>
+              <a:rPr lang="es-CL" sz="2800" dirty="0"/>
+              <a:t>Introducción</a:t>
+            </a:r>
+          </a:p>
+          <a:p>
+            <a:pPr marL="0" indent="0">
+              <a:lnSpc>
+                <a:spcPct val="150000"/>
+              </a:lnSpc>
+              <a:buNone/>
+            </a:pPr>
+            <a:r>
+              <a:rPr lang="es-CL" sz="2800" dirty="0"/>
+              <a:t>	Análisis orientado a objeto</a:t>
+            </a:r>
+          </a:p>
+          <a:p>
+            <a:pPr marL="0" indent="0">
+              <a:lnSpc>
+                <a:spcPct val="150000"/>
+              </a:lnSpc>
+              <a:buNone/>
+            </a:pPr>
+            <a:r>
+              <a:rPr lang="es-CL" sz="2800" dirty="0"/>
+              <a:t>	Diseño orientado a objeto</a:t>
+            </a:r>
+          </a:p>
+          <a:p>
+            <a:pPr marL="0" indent="0">
+              <a:lnSpc>
+                <a:spcPct val="150000"/>
+              </a:lnSpc>
+              <a:buNone/>
+            </a:pPr>
+            <a:r>
+              <a:rPr lang="es-CL" sz="2800" dirty="0"/>
+              <a:t>	Conclusiones</a:t>
+            </a:r>
+          </a:p>
+        </p:txBody>
+      </p:sp>
+      <p:sp>
+        <p:nvSpPr>
+          <p:cNvPr id="5" name="Estrella: 7 puntas 4">
+            <a:extLst>
+              <a:ext uri="{FF2B5EF4-FFF2-40B4-BE49-F238E27FC236}">
+                <a16:creationId xmlns:a16="http://schemas.microsoft.com/office/drawing/2014/main" id="{344E2906-8C0A-4516-9381-84F29E03A5B0}"/>
+              </a:ext>
+            </a:extLst>
+          </p:cNvPr>
+          <p:cNvSpPr/>
+          <p:nvPr/>
+        </p:nvSpPr>
+        <p:spPr>
+          <a:xfrm>
+            <a:off x="2418154" y="2761595"/>
+            <a:ext cx="558569" cy="482794"/>
+          </a:xfrm>
+          <a:prstGeom prst="star7">
+            <a:avLst/>
+          </a:prstGeom>
+          <a:solidFill>
+            <a:srgbClr val="F87956"/>
+          </a:solidFill>
+          <a:ln>
+            <a:solidFill>
+              <a:srgbClr val="F87956"/>
+            </a:solidFill>
+          </a:ln>
+        </p:spPr>
+        <p:style>
+          <a:lnRef idx="2">
+            <a:schemeClr val="accent1">
+              <a:shade val="50000"/>
+            </a:schemeClr>
+          </a:lnRef>
+          <a:fillRef idx="1">
+            <a:schemeClr val="accent1"/>
+          </a:fillRef>
+          <a:effectRef idx="0">
+            <a:schemeClr val="accent1"/>
+          </a:effectRef>
+          <a:fontRef idx="minor">
+            <a:schemeClr val="lt1"/>
+          </a:fontRef>
+        </p:style>
+        <p:txBody>
+          <a:bodyPr rtlCol="0" anchor="ctr"/>
+          <a:lstStyle/>
+          <a:p>
+            <a:pPr algn="ctr"/>
+            <a:endParaRPr lang="es-CL"/>
+          </a:p>
+        </p:txBody>
+      </p:sp>
+      <p:sp>
+        <p:nvSpPr>
+          <p:cNvPr id="6" name="Estrella: 7 puntas 5">
+            <a:extLst>
+              <a:ext uri="{FF2B5EF4-FFF2-40B4-BE49-F238E27FC236}">
+                <a16:creationId xmlns:a16="http://schemas.microsoft.com/office/drawing/2014/main" id="{BEE3D319-8D4C-4BF5-87CC-AAD440029B88}"/>
+              </a:ext>
+            </a:extLst>
+          </p:cNvPr>
+          <p:cNvSpPr/>
+          <p:nvPr/>
+        </p:nvSpPr>
+        <p:spPr>
+          <a:xfrm>
+            <a:off x="2418154" y="3527279"/>
+            <a:ext cx="558569" cy="482794"/>
+          </a:xfrm>
+          <a:prstGeom prst="star7">
+            <a:avLst/>
+          </a:prstGeom>
+          <a:solidFill>
+            <a:srgbClr val="F87956"/>
+          </a:solidFill>
+          <a:ln>
+            <a:solidFill>
+              <a:srgbClr val="F87956"/>
+            </a:solidFill>
+          </a:ln>
+        </p:spPr>
+        <p:style>
+          <a:lnRef idx="2">
+            <a:schemeClr val="accent1">
+              <a:shade val="50000"/>
+            </a:schemeClr>
+          </a:lnRef>
+          <a:fillRef idx="1">
+            <a:schemeClr val="accent1"/>
+          </a:fillRef>
+          <a:effectRef idx="0">
+            <a:schemeClr val="accent1"/>
+          </a:effectRef>
+          <a:fontRef idx="minor">
+            <a:schemeClr val="lt1"/>
+          </a:fontRef>
+        </p:style>
+        <p:txBody>
+          <a:bodyPr rtlCol="0" anchor="ctr"/>
+          <a:lstStyle/>
+          <a:p>
+            <a:pPr algn="ctr"/>
+            <a:endParaRPr lang="es-CL"/>
+          </a:p>
+        </p:txBody>
+      </p:sp>
+      <p:sp>
+        <p:nvSpPr>
+          <p:cNvPr id="7" name="Estrella: 7 puntas 6">
+            <a:extLst>
+              <a:ext uri="{FF2B5EF4-FFF2-40B4-BE49-F238E27FC236}">
+                <a16:creationId xmlns:a16="http://schemas.microsoft.com/office/drawing/2014/main" id="{A8DEC7C9-7D5C-43F2-B188-CD76AEE67F02}"/>
+              </a:ext>
+            </a:extLst>
+          </p:cNvPr>
+          <p:cNvSpPr/>
+          <p:nvPr/>
+        </p:nvSpPr>
+        <p:spPr>
+          <a:xfrm>
+            <a:off x="2418154" y="4295512"/>
+            <a:ext cx="558569" cy="482794"/>
+          </a:xfrm>
+          <a:prstGeom prst="star7">
+            <a:avLst/>
+          </a:prstGeom>
+          <a:solidFill>
+            <a:srgbClr val="F87956"/>
+          </a:solidFill>
+          <a:ln>
+            <a:solidFill>
+              <a:srgbClr val="F87956"/>
+            </a:solidFill>
+          </a:ln>
+        </p:spPr>
+        <p:style>
+          <a:lnRef idx="2">
+            <a:schemeClr val="accent1">
+              <a:shade val="50000"/>
+            </a:schemeClr>
+          </a:lnRef>
+          <a:fillRef idx="1">
+            <a:schemeClr val="accent1"/>
+          </a:fillRef>
+          <a:effectRef idx="0">
+            <a:schemeClr val="accent1"/>
+          </a:effectRef>
+          <a:fontRef idx="minor">
+            <a:schemeClr val="lt1"/>
+          </a:fontRef>
+        </p:style>
+        <p:txBody>
+          <a:bodyPr rtlCol="0" anchor="ctr"/>
+          <a:lstStyle/>
+          <a:p>
+            <a:pPr algn="ctr"/>
+            <a:endParaRPr lang="es-CL"/>
+          </a:p>
+        </p:txBody>
+      </p:sp>
+      <p:sp>
+        <p:nvSpPr>
+          <p:cNvPr id="8" name="Estrella: 7 puntas 7">
+            <a:extLst>
+              <a:ext uri="{FF2B5EF4-FFF2-40B4-BE49-F238E27FC236}">
+                <a16:creationId xmlns:a16="http://schemas.microsoft.com/office/drawing/2014/main" id="{6B769005-502D-438F-9F23-DB165EE6D950}"/>
+              </a:ext>
+            </a:extLst>
+          </p:cNvPr>
+          <p:cNvSpPr/>
+          <p:nvPr/>
+        </p:nvSpPr>
+        <p:spPr>
+          <a:xfrm>
+            <a:off x="2418153" y="5086270"/>
+            <a:ext cx="558569" cy="482794"/>
+          </a:xfrm>
+          <a:prstGeom prst="star7">
+            <a:avLst/>
+          </a:prstGeom>
+          <a:solidFill>
+            <a:srgbClr val="F87956"/>
+          </a:solidFill>
+          <a:ln>
+            <a:solidFill>
+              <a:srgbClr val="F87956"/>
+            </a:solidFill>
+          </a:ln>
+        </p:spPr>
+        <p:style>
+          <a:lnRef idx="2">
+            <a:schemeClr val="accent1">
+              <a:shade val="50000"/>
+            </a:schemeClr>
+          </a:lnRef>
+          <a:fillRef idx="1">
+            <a:schemeClr val="accent1"/>
+          </a:fillRef>
+          <a:effectRef idx="0">
+            <a:schemeClr val="accent1"/>
+          </a:effectRef>
+          <a:fontRef idx="minor">
+            <a:schemeClr val="lt1"/>
+          </a:fontRef>
+        </p:style>
+        <p:txBody>
+          <a:bodyPr rtlCol="0" anchor="ctr"/>
+          <a:lstStyle/>
+          <a:p>
+            <a:pPr algn="ctr"/>
+            <a:endParaRPr lang="es-CL"/>
+          </a:p>
+        </p:txBody>
+      </p:sp>
+    </p:spTree>
+    <p:extLst>
+      <p:ext uri="{BB962C8B-B14F-4D97-AF65-F5344CB8AC3E}">
+        <p14:creationId xmlns:p14="http://schemas.microsoft.com/office/powerpoint/2010/main" val="2878864776"/>
+      </p:ext>
+    </p:extLst>
+  </p:cSld>
+  <p:clrMapOvr>
+    <a:masterClrMapping/>
+  </p:clrMapOvr>
+</p:sld>
+</file>
+
+<file path=ppt/slides/slide20.xml><?xml version="1.0" encoding="utf-8"?>
 <p:sld xmlns:a="http://schemas.openxmlformats.org/drawingml/2006/main" xmlns:r="http://schemas.openxmlformats.org/officeDocument/2006/relationships" xmlns:p="http://schemas.openxmlformats.org/presentationml/2006/main">
   <p:cSld>
     <p:bg>
@@ -4078,7 +5272,7 @@
 </p:sld>
 </file>
 
-<file path=ppt/slides/slide17.xml><?xml version="1.0" encoding="utf-8"?>
+<file path=ppt/slides/slide21.xml><?xml version="1.0" encoding="utf-8"?>
 <p:sld xmlns:a="http://schemas.openxmlformats.org/drawingml/2006/main" xmlns:r="http://schemas.openxmlformats.org/officeDocument/2006/relationships" xmlns:p="http://schemas.openxmlformats.org/presentationml/2006/main">
   <p:cSld>
     <p:bg>
@@ -4146,7 +5340,7 @@
 </p:sld>
 </file>
 
-<file path=ppt/slides/slide18.xml><?xml version="1.0" encoding="utf-8"?>
+<file path=ppt/slides/slide22.xml><?xml version="1.0" encoding="utf-8"?>
 <p:sld xmlns:a="http://schemas.openxmlformats.org/drawingml/2006/main" xmlns:r="http://schemas.openxmlformats.org/officeDocument/2006/relationships" xmlns:p="http://schemas.openxmlformats.org/presentationml/2006/main">
   <p:cSld>
     <p:spTree>
@@ -4209,7 +5403,7 @@
 </p:sld>
 </file>
 
-<file path=ppt/slides/slide19.xml><?xml version="1.0" encoding="utf-8"?>
+<file path=ppt/slides/slide23.xml><?xml version="1.0" encoding="utf-8"?>
 <p:sld xmlns:a="http://schemas.openxmlformats.org/drawingml/2006/main" xmlns:r="http://schemas.openxmlformats.org/officeDocument/2006/relationships" xmlns:p="http://schemas.openxmlformats.org/presentationml/2006/main">
   <p:cSld>
     <p:bg>
@@ -4277,7 +5471,7 @@
 </p:sld>
 </file>
 
-<file path=ppt/slides/slide2.xml><?xml version="1.0" encoding="utf-8"?>
+<file path=ppt/slides/slide24.xml><?xml version="1.0" encoding="utf-8"?>
 <p:sld xmlns:a="http://schemas.openxmlformats.org/drawingml/2006/main" xmlns:r="http://schemas.openxmlformats.org/officeDocument/2006/relationships" xmlns:p="http://schemas.openxmlformats.org/presentationml/2006/main">
   <p:cSld>
     <p:spTree>
@@ -4299,354 +5493,6 @@
           <p:cNvPr id="2" name="Título 1">
             <a:extLst>
               <a:ext uri="{FF2B5EF4-FFF2-40B4-BE49-F238E27FC236}">
-                <a16:creationId xmlns:a16="http://schemas.microsoft.com/office/drawing/2014/main" id="{D3FCCAF2-47B3-4517-B296-12ABA7D65A9C}"/>
-              </a:ext>
-            </a:extLst>
-          </p:cNvPr>
-          <p:cNvSpPr>
-            <a:spLocks noGrp="1"/>
-          </p:cNvSpPr>
-          <p:nvPr>
-            <p:ph type="title"/>
-          </p:nvPr>
-        </p:nvSpPr>
-        <p:spPr/>
-        <p:txBody>
-          <a:bodyPr/>
-          <a:lstStyle/>
-          <a:p>
-            <a:r>
-              <a:rPr lang="es-CL" dirty="0"/>
-              <a:t>Contenido</a:t>
-            </a:r>
-          </a:p>
-        </p:txBody>
-      </p:sp>
-      <p:sp>
-        <p:nvSpPr>
-          <p:cNvPr id="3" name="Marcador de contenido 2">
-            <a:extLst>
-              <a:ext uri="{FF2B5EF4-FFF2-40B4-BE49-F238E27FC236}">
-                <a16:creationId xmlns:a16="http://schemas.microsoft.com/office/drawing/2014/main" id="{92474900-A44B-4DA3-B82C-CD77BBF795F7}"/>
-              </a:ext>
-            </a:extLst>
-          </p:cNvPr>
-          <p:cNvSpPr>
-            <a:spLocks noGrp="1"/>
-          </p:cNvSpPr>
-          <p:nvPr>
-            <p:ph idx="1"/>
-          </p:nvPr>
-        </p:nvSpPr>
-        <p:spPr/>
-        <p:txBody>
-          <a:bodyPr/>
-          <a:lstStyle/>
-          <a:p>
-            <a:pPr marL="0" indent="0">
-              <a:lnSpc>
-                <a:spcPct val="150000"/>
-              </a:lnSpc>
-              <a:buNone/>
-            </a:pPr>
-            <a:r>
-              <a:rPr lang="es-CL" dirty="0"/>
-              <a:t>	</a:t>
-            </a:r>
-            <a:r>
-              <a:rPr lang="es-CL" sz="2800" dirty="0"/>
-              <a:t>Introducción</a:t>
-            </a:r>
-          </a:p>
-          <a:p>
-            <a:pPr marL="0" indent="0">
-              <a:lnSpc>
-                <a:spcPct val="150000"/>
-              </a:lnSpc>
-              <a:buNone/>
-            </a:pPr>
-            <a:r>
-              <a:rPr lang="es-CL" sz="2800" dirty="0"/>
-              <a:t>	Análisis orientado a objeto</a:t>
-            </a:r>
-          </a:p>
-          <a:p>
-            <a:pPr marL="0" indent="0">
-              <a:lnSpc>
-                <a:spcPct val="150000"/>
-              </a:lnSpc>
-              <a:buNone/>
-            </a:pPr>
-            <a:r>
-              <a:rPr lang="es-CL" sz="2800" dirty="0"/>
-              <a:t>	Diseño orientado a objeto</a:t>
-            </a:r>
-          </a:p>
-          <a:p>
-            <a:pPr marL="0" indent="0">
-              <a:lnSpc>
-                <a:spcPct val="150000"/>
-              </a:lnSpc>
-              <a:buNone/>
-            </a:pPr>
-            <a:r>
-              <a:rPr lang="es-CL" sz="2800" dirty="0"/>
-              <a:t>	Conclusiones</a:t>
-            </a:r>
-          </a:p>
-        </p:txBody>
-      </p:sp>
-      <p:sp>
-        <p:nvSpPr>
-          <p:cNvPr id="5" name="Estrella: 7 puntas 4">
-            <a:extLst>
-              <a:ext uri="{FF2B5EF4-FFF2-40B4-BE49-F238E27FC236}">
-                <a16:creationId xmlns:a16="http://schemas.microsoft.com/office/drawing/2014/main" id="{344E2906-8C0A-4516-9381-84F29E03A5B0}"/>
-              </a:ext>
-            </a:extLst>
-          </p:cNvPr>
-          <p:cNvSpPr/>
-          <p:nvPr/>
-        </p:nvSpPr>
-        <p:spPr>
-          <a:xfrm>
-            <a:off x="2418154" y="2761595"/>
-            <a:ext cx="558569" cy="482794"/>
-          </a:xfrm>
-          <a:prstGeom prst="star7">
-            <a:avLst/>
-          </a:prstGeom>
-          <a:solidFill>
-            <a:srgbClr val="F87956"/>
-          </a:solidFill>
-          <a:ln>
-            <a:solidFill>
-              <a:srgbClr val="F87956"/>
-            </a:solidFill>
-          </a:ln>
-        </p:spPr>
-        <p:style>
-          <a:lnRef idx="2">
-            <a:schemeClr val="accent1">
-              <a:shade val="50000"/>
-            </a:schemeClr>
-          </a:lnRef>
-          <a:fillRef idx="1">
-            <a:schemeClr val="accent1"/>
-          </a:fillRef>
-          <a:effectRef idx="0">
-            <a:schemeClr val="accent1"/>
-          </a:effectRef>
-          <a:fontRef idx="minor">
-            <a:schemeClr val="lt1"/>
-          </a:fontRef>
-        </p:style>
-        <p:txBody>
-          <a:bodyPr rtlCol="0" anchor="ctr"/>
-          <a:lstStyle/>
-          <a:p>
-            <a:pPr algn="ctr"/>
-            <a:endParaRPr lang="es-CL"/>
-          </a:p>
-        </p:txBody>
-      </p:sp>
-      <p:sp>
-        <p:nvSpPr>
-          <p:cNvPr id="6" name="Estrella: 7 puntas 5">
-            <a:extLst>
-              <a:ext uri="{FF2B5EF4-FFF2-40B4-BE49-F238E27FC236}">
-                <a16:creationId xmlns:a16="http://schemas.microsoft.com/office/drawing/2014/main" id="{BEE3D319-8D4C-4BF5-87CC-AAD440029B88}"/>
-              </a:ext>
-            </a:extLst>
-          </p:cNvPr>
-          <p:cNvSpPr/>
-          <p:nvPr/>
-        </p:nvSpPr>
-        <p:spPr>
-          <a:xfrm>
-            <a:off x="2418154" y="3527279"/>
-            <a:ext cx="558569" cy="482794"/>
-          </a:xfrm>
-          <a:prstGeom prst="star7">
-            <a:avLst/>
-          </a:prstGeom>
-          <a:solidFill>
-            <a:srgbClr val="F87956"/>
-          </a:solidFill>
-          <a:ln>
-            <a:solidFill>
-              <a:srgbClr val="F87956"/>
-            </a:solidFill>
-          </a:ln>
-        </p:spPr>
-        <p:style>
-          <a:lnRef idx="2">
-            <a:schemeClr val="accent1">
-              <a:shade val="50000"/>
-            </a:schemeClr>
-          </a:lnRef>
-          <a:fillRef idx="1">
-            <a:schemeClr val="accent1"/>
-          </a:fillRef>
-          <a:effectRef idx="0">
-            <a:schemeClr val="accent1"/>
-          </a:effectRef>
-          <a:fontRef idx="minor">
-            <a:schemeClr val="lt1"/>
-          </a:fontRef>
-        </p:style>
-        <p:txBody>
-          <a:bodyPr rtlCol="0" anchor="ctr"/>
-          <a:lstStyle/>
-          <a:p>
-            <a:pPr algn="ctr"/>
-            <a:endParaRPr lang="es-CL"/>
-          </a:p>
-        </p:txBody>
-      </p:sp>
-      <p:sp>
-        <p:nvSpPr>
-          <p:cNvPr id="7" name="Estrella: 7 puntas 6">
-            <a:extLst>
-              <a:ext uri="{FF2B5EF4-FFF2-40B4-BE49-F238E27FC236}">
-                <a16:creationId xmlns:a16="http://schemas.microsoft.com/office/drawing/2014/main" id="{A8DEC7C9-7D5C-43F2-B188-CD76AEE67F02}"/>
-              </a:ext>
-            </a:extLst>
-          </p:cNvPr>
-          <p:cNvSpPr/>
-          <p:nvPr/>
-        </p:nvSpPr>
-        <p:spPr>
-          <a:xfrm>
-            <a:off x="2418154" y="4295512"/>
-            <a:ext cx="558569" cy="482794"/>
-          </a:xfrm>
-          <a:prstGeom prst="star7">
-            <a:avLst/>
-          </a:prstGeom>
-          <a:solidFill>
-            <a:srgbClr val="F87956"/>
-          </a:solidFill>
-          <a:ln>
-            <a:solidFill>
-              <a:srgbClr val="F87956"/>
-            </a:solidFill>
-          </a:ln>
-        </p:spPr>
-        <p:style>
-          <a:lnRef idx="2">
-            <a:schemeClr val="accent1">
-              <a:shade val="50000"/>
-            </a:schemeClr>
-          </a:lnRef>
-          <a:fillRef idx="1">
-            <a:schemeClr val="accent1"/>
-          </a:fillRef>
-          <a:effectRef idx="0">
-            <a:schemeClr val="accent1"/>
-          </a:effectRef>
-          <a:fontRef idx="minor">
-            <a:schemeClr val="lt1"/>
-          </a:fontRef>
-        </p:style>
-        <p:txBody>
-          <a:bodyPr rtlCol="0" anchor="ctr"/>
-          <a:lstStyle/>
-          <a:p>
-            <a:pPr algn="ctr"/>
-            <a:endParaRPr lang="es-CL"/>
-          </a:p>
-        </p:txBody>
-      </p:sp>
-      <p:sp>
-        <p:nvSpPr>
-          <p:cNvPr id="8" name="Estrella: 7 puntas 7">
-            <a:extLst>
-              <a:ext uri="{FF2B5EF4-FFF2-40B4-BE49-F238E27FC236}">
-                <a16:creationId xmlns:a16="http://schemas.microsoft.com/office/drawing/2014/main" id="{6B769005-502D-438F-9F23-DB165EE6D950}"/>
-              </a:ext>
-            </a:extLst>
-          </p:cNvPr>
-          <p:cNvSpPr/>
-          <p:nvPr/>
-        </p:nvSpPr>
-        <p:spPr>
-          <a:xfrm>
-            <a:off x="2418153" y="5086270"/>
-            <a:ext cx="558569" cy="482794"/>
-          </a:xfrm>
-          <a:prstGeom prst="star7">
-            <a:avLst/>
-          </a:prstGeom>
-          <a:solidFill>
-            <a:srgbClr val="F87956"/>
-          </a:solidFill>
-          <a:ln>
-            <a:solidFill>
-              <a:srgbClr val="F87956"/>
-            </a:solidFill>
-          </a:ln>
-        </p:spPr>
-        <p:style>
-          <a:lnRef idx="2">
-            <a:schemeClr val="accent1">
-              <a:shade val="50000"/>
-            </a:schemeClr>
-          </a:lnRef>
-          <a:fillRef idx="1">
-            <a:schemeClr val="accent1"/>
-          </a:fillRef>
-          <a:effectRef idx="0">
-            <a:schemeClr val="accent1"/>
-          </a:effectRef>
-          <a:fontRef idx="minor">
-            <a:schemeClr val="lt1"/>
-          </a:fontRef>
-        </p:style>
-        <p:txBody>
-          <a:bodyPr rtlCol="0" anchor="ctr"/>
-          <a:lstStyle/>
-          <a:p>
-            <a:pPr algn="ctr"/>
-            <a:endParaRPr lang="es-CL"/>
-          </a:p>
-        </p:txBody>
-      </p:sp>
-    </p:spTree>
-    <p:extLst>
-      <p:ext uri="{BB962C8B-B14F-4D97-AF65-F5344CB8AC3E}">
-        <p14:creationId xmlns:p14="http://schemas.microsoft.com/office/powerpoint/2010/main" val="2878864776"/>
-      </p:ext>
-    </p:extLst>
-  </p:cSld>
-  <p:clrMapOvr>
-    <a:masterClrMapping/>
-  </p:clrMapOvr>
-</p:sld>
-</file>
-
-<file path=ppt/slides/slide20.xml><?xml version="1.0" encoding="utf-8"?>
-<p:sld xmlns:a="http://schemas.openxmlformats.org/drawingml/2006/main" xmlns:r="http://schemas.openxmlformats.org/officeDocument/2006/relationships" xmlns:p="http://schemas.openxmlformats.org/presentationml/2006/main">
-  <p:cSld>
-    <p:spTree>
-      <p:nvGrpSpPr>
-        <p:cNvPr id="1" name=""/>
-        <p:cNvGrpSpPr/>
-        <p:nvPr/>
-      </p:nvGrpSpPr>
-      <p:grpSpPr>
-        <a:xfrm>
-          <a:off x="0" y="0"/>
-          <a:ext cx="0" cy="0"/>
-          <a:chOff x="0" y="0"/>
-          <a:chExt cx="0" cy="0"/>
-        </a:xfrm>
-      </p:grpSpPr>
-      <p:sp>
-        <p:nvSpPr>
-          <p:cNvPr id="2" name="Título 1">
-            <a:extLst>
-              <a:ext uri="{FF2B5EF4-FFF2-40B4-BE49-F238E27FC236}">
                 <a16:creationId xmlns:a16="http://schemas.microsoft.com/office/drawing/2014/main" id="{AE39A2B2-1397-4582-B99E-223CE944EEFA}"/>
               </a:ext>
             </a:extLst>
@@ -4688,7 +5534,7 @@
 </p:sld>
 </file>
 
-<file path=ppt/slides/slide21.xml><?xml version="1.0" encoding="utf-8"?>
+<file path=ppt/slides/slide25.xml><?xml version="1.0" encoding="utf-8"?>
 <p:sld xmlns:a="http://schemas.openxmlformats.org/drawingml/2006/main" xmlns:r="http://schemas.openxmlformats.org/officeDocument/2006/relationships" xmlns:p="http://schemas.openxmlformats.org/presentationml/2006/main">
   <p:cSld>
     <p:bg>
@@ -4756,7 +5602,7 @@
 </p:sld>
 </file>
 
-<file path=ppt/slides/slide22.xml><?xml version="1.0" encoding="utf-8"?>
+<file path=ppt/slides/slide26.xml><?xml version="1.0" encoding="utf-8"?>
 <p:sld xmlns:a="http://schemas.openxmlformats.org/drawingml/2006/main" xmlns:r="http://schemas.openxmlformats.org/officeDocument/2006/relationships" xmlns:p="http://schemas.openxmlformats.org/presentationml/2006/main">
   <p:cSld>
     <p:bg>
@@ -4824,7 +5670,7 @@
 </p:sld>
 </file>
 
-<file path=ppt/slides/slide23.xml><?xml version="1.0" encoding="utf-8"?>
+<file path=ppt/slides/slide27.xml><?xml version="1.0" encoding="utf-8"?>
 <p:sld xmlns:a="http://schemas.openxmlformats.org/drawingml/2006/main" xmlns:r="http://schemas.openxmlformats.org/officeDocument/2006/relationships" xmlns:p="http://schemas.openxmlformats.org/presentationml/2006/main">
   <p:cSld>
     <p:bg>
@@ -4892,7 +5738,7 @@
 </p:sld>
 </file>
 
-<file path=ppt/slides/slide24.xml><?xml version="1.0" encoding="utf-8"?>
+<file path=ppt/slides/slide28.xml><?xml version="1.0" encoding="utf-8"?>
 <p:sld xmlns:a="http://schemas.openxmlformats.org/drawingml/2006/main" xmlns:r="http://schemas.openxmlformats.org/officeDocument/2006/relationships" xmlns:p="http://schemas.openxmlformats.org/presentationml/2006/main">
   <p:cSld>
     <p:spTree>
@@ -4980,7 +5826,7 @@
 </p:sld>
 </file>
 
-<file path=ppt/slides/slide25.xml><?xml version="1.0" encoding="utf-8"?>
+<file path=ppt/slides/slide29.xml><?xml version="1.0" encoding="utf-8"?>
 <p:sld xmlns:a="http://schemas.openxmlformats.org/drawingml/2006/main" xmlns:r="http://schemas.openxmlformats.org/officeDocument/2006/relationships" xmlns:p="http://schemas.openxmlformats.org/presentationml/2006/main">
   <p:cSld>
     <p:spTree>

</xml_diff>